<commit_message>
Powershell scripts for telemetry simulator added OpenWeather temperature and humidity generator added
</commit_message>
<xml_diff>
--- a/Documents/Diagrams.pptx
+++ b/Documents/Diagrams.pptx
@@ -6,6 +6,7 @@
   </p:sldMasterIdLst>
   <p:sldIdLst>
     <p:sldId id="256" r:id="rId2"/>
+    <p:sldId id="257" r:id="rId3"/>
   </p:sldIdLst>
   <p:sldSz cx="12192000" cy="6858000"/>
   <p:notesSz cx="6858000" cy="9144000"/>
@@ -104,6 +105,11 @@
       </a:defRPr>
     </a:lvl9pPr>
   </p:defaultTextStyle>
+  <p:extLst>
+    <p:ext uri="{EFAFB233-063F-42B5-8137-9DF3F51BA10A}">
+      <p15:sldGuideLst xmlns:p15="http://schemas.microsoft.com/office/powerpoint/2012/main"/>
+    </p:ext>
+  </p:extLst>
 </p:presentation>
 </file>
 
@@ -254,7 +260,7 @@
           <a:p>
             <a:fld id="{33C3F64C-C526-40FB-AED9-C37B4F96ABD4}" type="datetimeFigureOut">
               <a:rPr lang="en-US" smtClean="0"/>
-              <a:t>07-Jan-21</a:t>
+              <a:t>20-Jan-21</a:t>
             </a:fld>
             <a:endParaRPr lang="en-US"/>
           </a:p>
@@ -452,7 +458,7 @@
           <a:p>
             <a:fld id="{33C3F64C-C526-40FB-AED9-C37B4F96ABD4}" type="datetimeFigureOut">
               <a:rPr lang="en-US" smtClean="0"/>
-              <a:t>07-Jan-21</a:t>
+              <a:t>20-Jan-21</a:t>
             </a:fld>
             <a:endParaRPr lang="en-US"/>
           </a:p>
@@ -660,7 +666,7 @@
           <a:p>
             <a:fld id="{33C3F64C-C526-40FB-AED9-C37B4F96ABD4}" type="datetimeFigureOut">
               <a:rPr lang="en-US" smtClean="0"/>
-              <a:t>07-Jan-21</a:t>
+              <a:t>20-Jan-21</a:t>
             </a:fld>
             <a:endParaRPr lang="en-US"/>
           </a:p>
@@ -858,7 +864,7 @@
           <a:p>
             <a:fld id="{33C3F64C-C526-40FB-AED9-C37B4F96ABD4}" type="datetimeFigureOut">
               <a:rPr lang="en-US" smtClean="0"/>
-              <a:t>07-Jan-21</a:t>
+              <a:t>20-Jan-21</a:t>
             </a:fld>
             <a:endParaRPr lang="en-US"/>
           </a:p>
@@ -1133,7 +1139,7 @@
           <a:p>
             <a:fld id="{33C3F64C-C526-40FB-AED9-C37B4F96ABD4}" type="datetimeFigureOut">
               <a:rPr lang="en-US" smtClean="0"/>
-              <a:t>07-Jan-21</a:t>
+              <a:t>20-Jan-21</a:t>
             </a:fld>
             <a:endParaRPr lang="en-US"/>
           </a:p>
@@ -1398,7 +1404,7 @@
           <a:p>
             <a:fld id="{33C3F64C-C526-40FB-AED9-C37B4F96ABD4}" type="datetimeFigureOut">
               <a:rPr lang="en-US" smtClean="0"/>
-              <a:t>07-Jan-21</a:t>
+              <a:t>20-Jan-21</a:t>
             </a:fld>
             <a:endParaRPr lang="en-US"/>
           </a:p>
@@ -1810,7 +1816,7 @@
           <a:p>
             <a:fld id="{33C3F64C-C526-40FB-AED9-C37B4F96ABD4}" type="datetimeFigureOut">
               <a:rPr lang="en-US" smtClean="0"/>
-              <a:t>07-Jan-21</a:t>
+              <a:t>20-Jan-21</a:t>
             </a:fld>
             <a:endParaRPr lang="en-US"/>
           </a:p>
@@ -1951,7 +1957,7 @@
           <a:p>
             <a:fld id="{33C3F64C-C526-40FB-AED9-C37B4F96ABD4}" type="datetimeFigureOut">
               <a:rPr lang="en-US" smtClean="0"/>
-              <a:t>07-Jan-21</a:t>
+              <a:t>20-Jan-21</a:t>
             </a:fld>
             <a:endParaRPr lang="en-US"/>
           </a:p>
@@ -2064,7 +2070,7 @@
           <a:p>
             <a:fld id="{33C3F64C-C526-40FB-AED9-C37B4F96ABD4}" type="datetimeFigureOut">
               <a:rPr lang="en-US" smtClean="0"/>
-              <a:t>07-Jan-21</a:t>
+              <a:t>20-Jan-21</a:t>
             </a:fld>
             <a:endParaRPr lang="en-US"/>
           </a:p>
@@ -2375,7 +2381,7 @@
           <a:p>
             <a:fld id="{33C3F64C-C526-40FB-AED9-C37B4F96ABD4}" type="datetimeFigureOut">
               <a:rPr lang="en-US" smtClean="0"/>
-              <a:t>07-Jan-21</a:t>
+              <a:t>20-Jan-21</a:t>
             </a:fld>
             <a:endParaRPr lang="en-US"/>
           </a:p>
@@ -2663,7 +2669,7 @@
           <a:p>
             <a:fld id="{33C3F64C-C526-40FB-AED9-C37B4F96ABD4}" type="datetimeFigureOut">
               <a:rPr lang="en-US" smtClean="0"/>
-              <a:t>07-Jan-21</a:t>
+              <a:t>20-Jan-21</a:t>
             </a:fld>
             <a:endParaRPr lang="en-US"/>
           </a:p>
@@ -2904,7 +2910,7 @@
           <a:p>
             <a:fld id="{33C3F64C-C526-40FB-AED9-C37B4F96ABD4}" type="datetimeFigureOut">
               <a:rPr lang="en-US" smtClean="0"/>
-              <a:t>07-Jan-21</a:t>
+              <a:t>20-Jan-21</a:t>
             </a:fld>
             <a:endParaRPr lang="en-US"/>
           </a:p>
@@ -3513,6 +3519,1322 @@
           </p:spPr>
         </p:pic>
       </p:grpSp>
+      <p:sp>
+        <p:nvSpPr>
+          <p:cNvPr id="27" name="TextBox 26">
+            <a:extLst>
+              <a:ext uri="{FF2B5EF4-FFF2-40B4-BE49-F238E27FC236}">
+                <a16:creationId xmlns:a16="http://schemas.microsoft.com/office/drawing/2014/main" id="{0F833F2A-F0E1-41E4-83BF-887C910BA9E2}"/>
+              </a:ext>
+            </a:extLst>
+          </p:cNvPr>
+          <p:cNvSpPr txBox="1"/>
+          <p:nvPr/>
+        </p:nvSpPr>
+        <p:spPr>
+          <a:xfrm>
+            <a:off x="1379382" y="4309000"/>
+            <a:ext cx="1701411" cy="307777"/>
+          </a:xfrm>
+          <a:prstGeom prst="rect">
+            <a:avLst/>
+          </a:prstGeom>
+          <a:noFill/>
+        </p:spPr>
+        <p:txBody>
+          <a:bodyPr wrap="square" rtlCol="0">
+            <a:spAutoFit/>
+          </a:bodyPr>
+          <a:lstStyle/>
+          <a:p>
+            <a:pPr algn="ctr"/>
+            <a:r>
+              <a:rPr lang="en-US" sz="1400" dirty="0"/>
+              <a:t>Telemetry Simulator</a:t>
+            </a:r>
+          </a:p>
+        </p:txBody>
+      </p:sp>
+      <p:cxnSp>
+        <p:nvCxnSpPr>
+          <p:cNvPr id="34" name="Straight Arrow Connector 33">
+            <a:extLst>
+              <a:ext uri="{FF2B5EF4-FFF2-40B4-BE49-F238E27FC236}">
+                <a16:creationId xmlns:a16="http://schemas.microsoft.com/office/drawing/2014/main" id="{DF2ECA76-E194-4AC3-8F86-61756BD7411A}"/>
+              </a:ext>
+            </a:extLst>
+          </p:cNvPr>
+          <p:cNvCxnSpPr>
+            <a:cxnSpLocks/>
+            <a:stCxn id="9" idx="3"/>
+            <a:endCxn id="20" idx="1"/>
+          </p:cNvCxnSpPr>
+          <p:nvPr/>
+        </p:nvCxnSpPr>
+        <p:spPr>
+          <a:xfrm>
+            <a:off x="2649314" y="2750548"/>
+            <a:ext cx="1379353" cy="500062"/>
+          </a:xfrm>
+          <a:prstGeom prst="straightConnector1">
+            <a:avLst/>
+          </a:prstGeom>
+          <a:ln w="38100">
+            <a:tailEnd type="triangle"/>
+          </a:ln>
+        </p:spPr>
+        <p:style>
+          <a:lnRef idx="1">
+            <a:schemeClr val="accent1"/>
+          </a:lnRef>
+          <a:fillRef idx="0">
+            <a:schemeClr val="accent1"/>
+          </a:fillRef>
+          <a:effectRef idx="0">
+            <a:schemeClr val="accent1"/>
+          </a:effectRef>
+          <a:fontRef idx="minor">
+            <a:schemeClr val="tx1"/>
+          </a:fontRef>
+        </p:style>
+      </p:cxnSp>
+      <p:cxnSp>
+        <p:nvCxnSpPr>
+          <p:cNvPr id="37" name="Straight Arrow Connector 36">
+            <a:extLst>
+              <a:ext uri="{FF2B5EF4-FFF2-40B4-BE49-F238E27FC236}">
+                <a16:creationId xmlns:a16="http://schemas.microsoft.com/office/drawing/2014/main" id="{C4DAE6D7-DD43-4B94-96EE-BA763B9E7C34}"/>
+              </a:ext>
+            </a:extLst>
+          </p:cNvPr>
+          <p:cNvCxnSpPr>
+            <a:cxnSpLocks/>
+            <a:stCxn id="26" idx="3"/>
+            <a:endCxn id="20" idx="1"/>
+          </p:cNvCxnSpPr>
+          <p:nvPr/>
+        </p:nvCxnSpPr>
+        <p:spPr>
+          <a:xfrm flipV="1">
+            <a:off x="3080792" y="3250610"/>
+            <a:ext cx="947875" cy="672432"/>
+          </a:xfrm>
+          <a:prstGeom prst="straightConnector1">
+            <a:avLst/>
+          </a:prstGeom>
+          <a:ln w="38100">
+            <a:tailEnd type="triangle"/>
+          </a:ln>
+        </p:spPr>
+        <p:style>
+          <a:lnRef idx="1">
+            <a:schemeClr val="accent1"/>
+          </a:lnRef>
+          <a:fillRef idx="0">
+            <a:schemeClr val="accent1"/>
+          </a:fillRef>
+          <a:effectRef idx="0">
+            <a:schemeClr val="accent1"/>
+          </a:effectRef>
+          <a:fontRef idx="minor">
+            <a:schemeClr val="tx1"/>
+          </a:fontRef>
+        </p:style>
+      </p:cxnSp>
+      <p:grpSp>
+        <p:nvGrpSpPr>
+          <p:cNvPr id="55" name="Group 54">
+            <a:extLst>
+              <a:ext uri="{FF2B5EF4-FFF2-40B4-BE49-F238E27FC236}">
+                <a16:creationId xmlns:a16="http://schemas.microsoft.com/office/drawing/2014/main" id="{0E63E077-77E7-4829-A77D-5ADC19F58F06}"/>
+              </a:ext>
+            </a:extLst>
+          </p:cNvPr>
+          <p:cNvGrpSpPr/>
+          <p:nvPr/>
+        </p:nvGrpSpPr>
+        <p:grpSpPr>
+          <a:xfrm>
+            <a:off x="4028665" y="2586241"/>
+            <a:ext cx="1371602" cy="1351343"/>
+            <a:chOff x="4054791" y="1750218"/>
+            <a:chExt cx="1371602" cy="1351343"/>
+          </a:xfrm>
+        </p:grpSpPr>
+        <p:sp>
+          <p:nvSpPr>
+            <p:cNvPr id="20" name="Rectangle: Rounded Corners 19">
+              <a:extLst>
+                <a:ext uri="{FF2B5EF4-FFF2-40B4-BE49-F238E27FC236}">
+                  <a16:creationId xmlns:a16="http://schemas.microsoft.com/office/drawing/2014/main" id="{234D77D9-8724-4DE7-B8DF-DC873408EA9F}"/>
+                </a:ext>
+              </a:extLst>
+            </p:cNvPr>
+            <p:cNvSpPr/>
+            <p:nvPr/>
+          </p:nvSpPr>
+          <p:spPr>
+            <a:xfrm>
+              <a:off x="4054793" y="1750218"/>
+              <a:ext cx="1371600" cy="1328738"/>
+            </a:xfrm>
+            <a:prstGeom prst="roundRect">
+              <a:avLst/>
+            </a:prstGeom>
+            <a:solidFill>
+              <a:schemeClr val="bg1"/>
+            </a:solidFill>
+            <a:ln w="28575">
+              <a:solidFill>
+                <a:schemeClr val="tx1"/>
+              </a:solidFill>
+            </a:ln>
+          </p:spPr>
+          <p:style>
+            <a:lnRef idx="2">
+              <a:schemeClr val="accent1">
+                <a:shade val="50000"/>
+              </a:schemeClr>
+            </a:lnRef>
+            <a:fillRef idx="1">
+              <a:schemeClr val="accent1"/>
+            </a:fillRef>
+            <a:effectRef idx="0">
+              <a:schemeClr val="accent1"/>
+            </a:effectRef>
+            <a:fontRef idx="minor">
+              <a:schemeClr val="lt1"/>
+            </a:fontRef>
+          </p:style>
+          <p:txBody>
+            <a:bodyPr rtlCol="0" anchor="ctr"/>
+            <a:lstStyle/>
+            <a:p>
+              <a:pPr algn="ctr"/>
+              <a:endParaRPr lang="en-US"/>
+            </a:p>
+          </p:txBody>
+        </p:sp>
+        <p:pic>
+          <p:nvPicPr>
+            <p:cNvPr id="19" name="Graphic 18">
+              <a:extLst>
+                <a:ext uri="{FF2B5EF4-FFF2-40B4-BE49-F238E27FC236}">
+                  <a16:creationId xmlns:a16="http://schemas.microsoft.com/office/drawing/2014/main" id="{B08DD089-BBE3-49ED-BE63-B9E6434AB502}"/>
+                </a:ext>
+              </a:extLst>
+            </p:cNvPr>
+            <p:cNvPicPr>
+              <a:picLocks noChangeAspect="1"/>
+            </p:cNvPicPr>
+            <p:nvPr/>
+          </p:nvPicPr>
+          <p:blipFill>
+            <a:blip r:embed="rId4">
+              <a:extLst>
+                <a:ext uri="{28A0092B-C50C-407E-A947-70E740481C1C}">
+                  <a14:useLocalDpi xmlns:a14="http://schemas.microsoft.com/office/drawing/2010/main" val="0"/>
+                </a:ext>
+                <a:ext uri="{96DAC541-7B7A-43D3-8B79-37D633B846F1}">
+                  <asvg:svgBlip xmlns:asvg="http://schemas.microsoft.com/office/drawing/2016/SVG/main" r:embed="rId5"/>
+                </a:ext>
+              </a:extLst>
+            </a:blip>
+            <a:stretch>
+              <a:fillRect/>
+            </a:stretch>
+          </p:blipFill>
+          <p:spPr>
+            <a:xfrm>
+              <a:off x="4892738" y="1837029"/>
+              <a:ext cx="457200" cy="457200"/>
+            </a:xfrm>
+            <a:prstGeom prst="rect">
+              <a:avLst/>
+            </a:prstGeom>
+          </p:spPr>
+        </p:pic>
+        <p:sp>
+          <p:nvSpPr>
+            <p:cNvPr id="41" name="TextBox 40">
+              <a:extLst>
+                <a:ext uri="{FF2B5EF4-FFF2-40B4-BE49-F238E27FC236}">
+                  <a16:creationId xmlns:a16="http://schemas.microsoft.com/office/drawing/2014/main" id="{89847BA8-3435-4A40-9E70-5AA0D5421385}"/>
+                </a:ext>
+              </a:extLst>
+            </p:cNvPr>
+            <p:cNvSpPr txBox="1"/>
+            <p:nvPr/>
+          </p:nvSpPr>
+          <p:spPr>
+            <a:xfrm>
+              <a:off x="4054791" y="2793784"/>
+              <a:ext cx="1371599" cy="307777"/>
+            </a:xfrm>
+            <a:prstGeom prst="rect">
+              <a:avLst/>
+            </a:prstGeom>
+            <a:noFill/>
+          </p:spPr>
+          <p:txBody>
+            <a:bodyPr wrap="square" rtlCol="0">
+              <a:spAutoFit/>
+            </a:bodyPr>
+            <a:lstStyle/>
+            <a:p>
+              <a:pPr algn="ctr"/>
+              <a:r>
+                <a:rPr lang="en-US" sz="1400" dirty="0"/>
+                <a:t>IoT Hub</a:t>
+              </a:r>
+            </a:p>
+          </p:txBody>
+        </p:sp>
+      </p:grpSp>
+      <p:grpSp>
+        <p:nvGrpSpPr>
+          <p:cNvPr id="57" name="Group 56">
+            <a:extLst>
+              <a:ext uri="{FF2B5EF4-FFF2-40B4-BE49-F238E27FC236}">
+                <a16:creationId xmlns:a16="http://schemas.microsoft.com/office/drawing/2014/main" id="{255C2CB2-D2B1-4C19-A59F-AD52157DC714}"/>
+              </a:ext>
+            </a:extLst>
+          </p:cNvPr>
+          <p:cNvGrpSpPr/>
+          <p:nvPr/>
+        </p:nvGrpSpPr>
+        <p:grpSpPr>
+          <a:xfrm>
+            <a:off x="9034288" y="2450323"/>
+            <a:ext cx="1931195" cy="1775732"/>
+            <a:chOff x="9578112" y="2087404"/>
+            <a:chExt cx="1931195" cy="1775732"/>
+          </a:xfrm>
+        </p:grpSpPr>
+        <p:sp>
+          <p:nvSpPr>
+            <p:cNvPr id="22" name="Rectangle: Rounded Corners 21">
+              <a:extLst>
+                <a:ext uri="{FF2B5EF4-FFF2-40B4-BE49-F238E27FC236}">
+                  <a16:creationId xmlns:a16="http://schemas.microsoft.com/office/drawing/2014/main" id="{3B069519-3A68-421C-852C-BF59B6E0CC34}"/>
+                </a:ext>
+              </a:extLst>
+            </p:cNvPr>
+            <p:cNvSpPr/>
+            <p:nvPr/>
+          </p:nvSpPr>
+          <p:spPr>
+            <a:xfrm>
+              <a:off x="9578114" y="2087404"/>
+              <a:ext cx="1931193" cy="1775732"/>
+            </a:xfrm>
+            <a:prstGeom prst="roundRect">
+              <a:avLst/>
+            </a:prstGeom>
+            <a:solidFill>
+              <a:schemeClr val="bg1"/>
+            </a:solidFill>
+            <a:ln w="28575">
+              <a:solidFill>
+                <a:schemeClr val="tx1"/>
+              </a:solidFill>
+            </a:ln>
+          </p:spPr>
+          <p:style>
+            <a:lnRef idx="2">
+              <a:schemeClr val="accent1">
+                <a:shade val="50000"/>
+              </a:schemeClr>
+            </a:lnRef>
+            <a:fillRef idx="1">
+              <a:schemeClr val="accent1"/>
+            </a:fillRef>
+            <a:effectRef idx="0">
+              <a:schemeClr val="accent1"/>
+            </a:effectRef>
+            <a:fontRef idx="minor">
+              <a:schemeClr val="lt1"/>
+            </a:fontRef>
+          </p:style>
+          <p:txBody>
+            <a:bodyPr rtlCol="0" anchor="ctr"/>
+            <a:lstStyle/>
+            <a:p>
+              <a:pPr algn="ctr"/>
+              <a:endParaRPr lang="en-US"/>
+            </a:p>
+          </p:txBody>
+        </p:sp>
+        <p:sp>
+          <p:nvSpPr>
+            <p:cNvPr id="43" name="TextBox 42">
+              <a:extLst>
+                <a:ext uri="{FF2B5EF4-FFF2-40B4-BE49-F238E27FC236}">
+                  <a16:creationId xmlns:a16="http://schemas.microsoft.com/office/drawing/2014/main" id="{C2621AED-405E-44FE-A71D-107916912584}"/>
+                </a:ext>
+              </a:extLst>
+            </p:cNvPr>
+            <p:cNvSpPr txBox="1"/>
+            <p:nvPr/>
+          </p:nvSpPr>
+          <p:spPr>
+            <a:xfrm>
+              <a:off x="9578112" y="3548011"/>
+              <a:ext cx="1931192" cy="307777"/>
+            </a:xfrm>
+            <a:prstGeom prst="rect">
+              <a:avLst/>
+            </a:prstGeom>
+            <a:noFill/>
+          </p:spPr>
+          <p:txBody>
+            <a:bodyPr wrap="square" rtlCol="0">
+              <a:spAutoFit/>
+            </a:bodyPr>
+            <a:lstStyle/>
+            <a:p>
+              <a:pPr algn="ctr"/>
+              <a:r>
+                <a:rPr lang="en-US" sz="1400" dirty="0"/>
+                <a:t>Telemetry Devices</a:t>
+              </a:r>
+            </a:p>
+          </p:txBody>
+        </p:sp>
+      </p:grpSp>
+      <p:grpSp>
+        <p:nvGrpSpPr>
+          <p:cNvPr id="56" name="Group 55">
+            <a:extLst>
+              <a:ext uri="{FF2B5EF4-FFF2-40B4-BE49-F238E27FC236}">
+                <a16:creationId xmlns:a16="http://schemas.microsoft.com/office/drawing/2014/main" id="{8BCBDCD7-2B9C-42A2-925D-3CDE43BA3D96}"/>
+              </a:ext>
+            </a:extLst>
+          </p:cNvPr>
+          <p:cNvGrpSpPr/>
+          <p:nvPr/>
+        </p:nvGrpSpPr>
+        <p:grpSpPr>
+          <a:xfrm>
+            <a:off x="6060214" y="2569469"/>
+            <a:ext cx="1701411" cy="1354219"/>
+            <a:chOff x="6797994" y="2207418"/>
+            <a:chExt cx="1701411" cy="1354219"/>
+          </a:xfrm>
+        </p:grpSpPr>
+        <p:sp>
+          <p:nvSpPr>
+            <p:cNvPr id="48" name="Rectangle: Rounded Corners 47">
+              <a:extLst>
+                <a:ext uri="{FF2B5EF4-FFF2-40B4-BE49-F238E27FC236}">
+                  <a16:creationId xmlns:a16="http://schemas.microsoft.com/office/drawing/2014/main" id="{80E676D0-D463-46FF-AEB0-98E55F36713B}"/>
+                </a:ext>
+              </a:extLst>
+            </p:cNvPr>
+            <p:cNvSpPr/>
+            <p:nvPr/>
+          </p:nvSpPr>
+          <p:spPr>
+            <a:xfrm>
+              <a:off x="6797994" y="2207418"/>
+              <a:ext cx="1688068" cy="1328738"/>
+            </a:xfrm>
+            <a:prstGeom prst="roundRect">
+              <a:avLst/>
+            </a:prstGeom>
+            <a:solidFill>
+              <a:schemeClr val="bg1"/>
+            </a:solidFill>
+            <a:ln w="28575">
+              <a:solidFill>
+                <a:schemeClr val="tx1"/>
+              </a:solidFill>
+            </a:ln>
+          </p:spPr>
+          <p:style>
+            <a:lnRef idx="2">
+              <a:schemeClr val="accent1">
+                <a:shade val="50000"/>
+              </a:schemeClr>
+            </a:lnRef>
+            <a:fillRef idx="1">
+              <a:schemeClr val="accent1"/>
+            </a:fillRef>
+            <a:effectRef idx="0">
+              <a:schemeClr val="accent1"/>
+            </a:effectRef>
+            <a:fontRef idx="minor">
+              <a:schemeClr val="lt1"/>
+            </a:fontRef>
+          </p:style>
+          <p:txBody>
+            <a:bodyPr rtlCol="0" anchor="ctr"/>
+            <a:lstStyle/>
+            <a:p>
+              <a:pPr algn="ctr"/>
+              <a:endParaRPr lang="en-US"/>
+            </a:p>
+          </p:txBody>
+        </p:sp>
+        <p:sp>
+          <p:nvSpPr>
+            <p:cNvPr id="52" name="TextBox 51">
+              <a:extLst>
+                <a:ext uri="{FF2B5EF4-FFF2-40B4-BE49-F238E27FC236}">
+                  <a16:creationId xmlns:a16="http://schemas.microsoft.com/office/drawing/2014/main" id="{A6FE7A35-A89D-4D19-B7CD-BACBEE3F6618}"/>
+                </a:ext>
+              </a:extLst>
+            </p:cNvPr>
+            <p:cNvSpPr txBox="1"/>
+            <p:nvPr/>
+          </p:nvSpPr>
+          <p:spPr>
+            <a:xfrm>
+              <a:off x="6797994" y="3038417"/>
+              <a:ext cx="1701411" cy="523220"/>
+            </a:xfrm>
+            <a:prstGeom prst="rect">
+              <a:avLst/>
+            </a:prstGeom>
+            <a:noFill/>
+          </p:spPr>
+          <p:txBody>
+            <a:bodyPr wrap="square" rtlCol="0">
+              <a:spAutoFit/>
+            </a:bodyPr>
+            <a:lstStyle/>
+            <a:p>
+              <a:pPr algn="ctr"/>
+              <a:r>
+                <a:rPr lang="en-US" sz="1400" dirty="0"/>
+                <a:t>Telemetry Dispatcher</a:t>
+              </a:r>
+            </a:p>
+          </p:txBody>
+        </p:sp>
+      </p:grpSp>
+      <p:cxnSp>
+        <p:nvCxnSpPr>
+          <p:cNvPr id="60" name="Straight Arrow Connector 59">
+            <a:extLst>
+              <a:ext uri="{FF2B5EF4-FFF2-40B4-BE49-F238E27FC236}">
+                <a16:creationId xmlns:a16="http://schemas.microsoft.com/office/drawing/2014/main" id="{656E4092-4231-4C71-A80E-633AE171F22E}"/>
+              </a:ext>
+            </a:extLst>
+          </p:cNvPr>
+          <p:cNvCxnSpPr>
+            <a:cxnSpLocks/>
+            <a:stCxn id="20" idx="3"/>
+            <a:endCxn id="48" idx="1"/>
+          </p:cNvCxnSpPr>
+          <p:nvPr/>
+        </p:nvCxnSpPr>
+        <p:spPr>
+          <a:xfrm flipV="1">
+            <a:off x="5400267" y="3233838"/>
+            <a:ext cx="659947" cy="16772"/>
+          </a:xfrm>
+          <a:prstGeom prst="straightConnector1">
+            <a:avLst/>
+          </a:prstGeom>
+          <a:ln w="38100">
+            <a:tailEnd type="triangle"/>
+          </a:ln>
+        </p:spPr>
+        <p:style>
+          <a:lnRef idx="1">
+            <a:schemeClr val="accent1"/>
+          </a:lnRef>
+          <a:fillRef idx="0">
+            <a:schemeClr val="accent1"/>
+          </a:fillRef>
+          <a:effectRef idx="0">
+            <a:schemeClr val="accent1"/>
+          </a:effectRef>
+          <a:fontRef idx="minor">
+            <a:schemeClr val="tx1"/>
+          </a:fontRef>
+        </p:style>
+      </p:cxnSp>
+      <p:cxnSp>
+        <p:nvCxnSpPr>
+          <p:cNvPr id="64" name="Straight Arrow Connector 63">
+            <a:extLst>
+              <a:ext uri="{FF2B5EF4-FFF2-40B4-BE49-F238E27FC236}">
+                <a16:creationId xmlns:a16="http://schemas.microsoft.com/office/drawing/2014/main" id="{72E52F94-84D5-4C02-B49C-395E1C43E4BB}"/>
+              </a:ext>
+            </a:extLst>
+          </p:cNvPr>
+          <p:cNvCxnSpPr>
+            <a:cxnSpLocks/>
+            <a:stCxn id="48" idx="3"/>
+            <a:endCxn id="78" idx="2"/>
+          </p:cNvCxnSpPr>
+          <p:nvPr/>
+        </p:nvCxnSpPr>
+        <p:spPr>
+          <a:xfrm>
+            <a:off x="7748282" y="3233838"/>
+            <a:ext cx="900487" cy="20492"/>
+          </a:xfrm>
+          <a:prstGeom prst="straightConnector1">
+            <a:avLst/>
+          </a:prstGeom>
+          <a:ln w="38100">
+            <a:tailEnd type="triangle"/>
+          </a:ln>
+        </p:spPr>
+        <p:style>
+          <a:lnRef idx="1">
+            <a:schemeClr val="accent1"/>
+          </a:lnRef>
+          <a:fillRef idx="0">
+            <a:schemeClr val="accent1"/>
+          </a:fillRef>
+          <a:effectRef idx="0">
+            <a:schemeClr val="accent1"/>
+          </a:effectRef>
+          <a:fontRef idx="minor">
+            <a:schemeClr val="tx1"/>
+          </a:fontRef>
+        </p:style>
+      </p:cxnSp>
+      <p:grpSp>
+        <p:nvGrpSpPr>
+          <p:cNvPr id="80" name="Group 79">
+            <a:extLst>
+              <a:ext uri="{FF2B5EF4-FFF2-40B4-BE49-F238E27FC236}">
+                <a16:creationId xmlns:a16="http://schemas.microsoft.com/office/drawing/2014/main" id="{FF534C36-4A7E-45C9-B3DA-EDFA62BDDFBD}"/>
+              </a:ext>
+            </a:extLst>
+          </p:cNvPr>
+          <p:cNvGrpSpPr/>
+          <p:nvPr/>
+        </p:nvGrpSpPr>
+        <p:grpSpPr>
+          <a:xfrm>
+            <a:off x="8648769" y="3167244"/>
+            <a:ext cx="374469" cy="174171"/>
+            <a:chOff x="6435634" y="5416731"/>
+            <a:chExt cx="374469" cy="174171"/>
+          </a:xfrm>
+        </p:grpSpPr>
+        <p:cxnSp>
+          <p:nvCxnSpPr>
+            <p:cNvPr id="77" name="Straight Connector 76">
+              <a:extLst>
+                <a:ext uri="{FF2B5EF4-FFF2-40B4-BE49-F238E27FC236}">
+                  <a16:creationId xmlns:a16="http://schemas.microsoft.com/office/drawing/2014/main" id="{5DC6D724-C10D-4FEA-8AB2-8DE50538B27C}"/>
+                </a:ext>
+              </a:extLst>
+            </p:cNvPr>
+            <p:cNvCxnSpPr/>
+            <p:nvPr/>
+          </p:nvCxnSpPr>
+          <p:spPr>
+            <a:xfrm>
+              <a:off x="6522720" y="5503817"/>
+              <a:ext cx="287383" cy="0"/>
+            </a:xfrm>
+            <a:prstGeom prst="line">
+              <a:avLst/>
+            </a:prstGeom>
+            <a:ln w="38100"/>
+          </p:spPr>
+          <p:style>
+            <a:lnRef idx="1">
+              <a:schemeClr val="dk1"/>
+            </a:lnRef>
+            <a:fillRef idx="0">
+              <a:schemeClr val="dk1"/>
+            </a:fillRef>
+            <a:effectRef idx="0">
+              <a:schemeClr val="dk1"/>
+            </a:effectRef>
+            <a:fontRef idx="minor">
+              <a:schemeClr val="tx1"/>
+            </a:fontRef>
+          </p:style>
+        </p:cxnSp>
+        <p:sp>
+          <p:nvSpPr>
+            <p:cNvPr id="78" name="Oval 77">
+              <a:extLst>
+                <a:ext uri="{FF2B5EF4-FFF2-40B4-BE49-F238E27FC236}">
+                  <a16:creationId xmlns:a16="http://schemas.microsoft.com/office/drawing/2014/main" id="{1580FCCD-8A81-4292-9298-4964E250DD43}"/>
+                </a:ext>
+              </a:extLst>
+            </p:cNvPr>
+            <p:cNvSpPr/>
+            <p:nvPr/>
+          </p:nvSpPr>
+          <p:spPr>
+            <a:xfrm>
+              <a:off x="6435634" y="5416731"/>
+              <a:ext cx="174171" cy="174171"/>
+            </a:xfrm>
+            <a:prstGeom prst="ellipse">
+              <a:avLst/>
+            </a:prstGeom>
+            <a:solidFill>
+              <a:schemeClr val="bg1"/>
+            </a:solidFill>
+            <a:ln w="38100">
+              <a:solidFill>
+                <a:schemeClr val="tx1"/>
+              </a:solidFill>
+            </a:ln>
+          </p:spPr>
+          <p:style>
+            <a:lnRef idx="2">
+              <a:schemeClr val="accent1">
+                <a:shade val="50000"/>
+              </a:schemeClr>
+            </a:lnRef>
+            <a:fillRef idx="1">
+              <a:schemeClr val="accent1"/>
+            </a:fillRef>
+            <a:effectRef idx="0">
+              <a:schemeClr val="accent1"/>
+            </a:effectRef>
+            <a:fontRef idx="minor">
+              <a:schemeClr val="lt1"/>
+            </a:fontRef>
+          </p:style>
+          <p:txBody>
+            <a:bodyPr rtlCol="0" anchor="ctr"/>
+            <a:lstStyle/>
+            <a:p>
+              <a:pPr algn="ctr"/>
+              <a:endParaRPr lang="en-US"/>
+            </a:p>
+          </p:txBody>
+        </p:sp>
+      </p:grpSp>
+      <p:grpSp>
+        <p:nvGrpSpPr>
+          <p:cNvPr id="82" name="Group 81">
+            <a:extLst>
+              <a:ext uri="{FF2B5EF4-FFF2-40B4-BE49-F238E27FC236}">
+                <a16:creationId xmlns:a16="http://schemas.microsoft.com/office/drawing/2014/main" id="{5BDBCCB8-9D4B-43E6-8115-F888D2A0AB27}"/>
+              </a:ext>
+            </a:extLst>
+          </p:cNvPr>
+          <p:cNvGrpSpPr/>
+          <p:nvPr/>
+        </p:nvGrpSpPr>
+        <p:grpSpPr>
+          <a:xfrm rot="16200000">
+            <a:off x="9750298" y="4375802"/>
+            <a:ext cx="374469" cy="174171"/>
+            <a:chOff x="6435634" y="5416731"/>
+            <a:chExt cx="374469" cy="174171"/>
+          </a:xfrm>
+        </p:grpSpPr>
+        <p:cxnSp>
+          <p:nvCxnSpPr>
+            <p:cNvPr id="83" name="Straight Connector 82">
+              <a:extLst>
+                <a:ext uri="{FF2B5EF4-FFF2-40B4-BE49-F238E27FC236}">
+                  <a16:creationId xmlns:a16="http://schemas.microsoft.com/office/drawing/2014/main" id="{2612C707-57AF-4541-8086-A2ADF55A14B7}"/>
+                </a:ext>
+              </a:extLst>
+            </p:cNvPr>
+            <p:cNvCxnSpPr/>
+            <p:nvPr/>
+          </p:nvCxnSpPr>
+          <p:spPr>
+            <a:xfrm>
+              <a:off x="6522720" y="5503817"/>
+              <a:ext cx="287383" cy="0"/>
+            </a:xfrm>
+            <a:prstGeom prst="line">
+              <a:avLst/>
+            </a:prstGeom>
+            <a:ln w="38100"/>
+          </p:spPr>
+          <p:style>
+            <a:lnRef idx="1">
+              <a:schemeClr val="dk1"/>
+            </a:lnRef>
+            <a:fillRef idx="0">
+              <a:schemeClr val="dk1"/>
+            </a:fillRef>
+            <a:effectRef idx="0">
+              <a:schemeClr val="dk1"/>
+            </a:effectRef>
+            <a:fontRef idx="minor">
+              <a:schemeClr val="tx1"/>
+            </a:fontRef>
+          </p:style>
+        </p:cxnSp>
+        <p:sp>
+          <p:nvSpPr>
+            <p:cNvPr id="84" name="Oval 83">
+              <a:extLst>
+                <a:ext uri="{FF2B5EF4-FFF2-40B4-BE49-F238E27FC236}">
+                  <a16:creationId xmlns:a16="http://schemas.microsoft.com/office/drawing/2014/main" id="{84BF8D9A-5A31-42C8-9E90-FB70A2729067}"/>
+                </a:ext>
+              </a:extLst>
+            </p:cNvPr>
+            <p:cNvSpPr/>
+            <p:nvPr/>
+          </p:nvSpPr>
+          <p:spPr>
+            <a:xfrm>
+              <a:off x="6435634" y="5416731"/>
+              <a:ext cx="174171" cy="174171"/>
+            </a:xfrm>
+            <a:prstGeom prst="ellipse">
+              <a:avLst/>
+            </a:prstGeom>
+            <a:solidFill>
+              <a:schemeClr val="bg1"/>
+            </a:solidFill>
+            <a:ln w="38100">
+              <a:solidFill>
+                <a:schemeClr val="tx1"/>
+              </a:solidFill>
+            </a:ln>
+          </p:spPr>
+          <p:style>
+            <a:lnRef idx="2">
+              <a:schemeClr val="accent1">
+                <a:shade val="50000"/>
+              </a:schemeClr>
+            </a:lnRef>
+            <a:fillRef idx="1">
+              <a:schemeClr val="accent1"/>
+            </a:fillRef>
+            <a:effectRef idx="0">
+              <a:schemeClr val="accent1"/>
+            </a:effectRef>
+            <a:fontRef idx="minor">
+              <a:schemeClr val="lt1"/>
+            </a:fontRef>
+          </p:style>
+          <p:txBody>
+            <a:bodyPr rtlCol="0" anchor="ctr"/>
+            <a:lstStyle/>
+            <a:p>
+              <a:pPr algn="ctr"/>
+              <a:endParaRPr lang="en-US"/>
+            </a:p>
+          </p:txBody>
+        </p:sp>
+      </p:grpSp>
+      <p:grpSp>
+        <p:nvGrpSpPr>
+          <p:cNvPr id="93" name="Group 92">
+            <a:extLst>
+              <a:ext uri="{FF2B5EF4-FFF2-40B4-BE49-F238E27FC236}">
+                <a16:creationId xmlns:a16="http://schemas.microsoft.com/office/drawing/2014/main" id="{6E320CCD-BB90-42A4-B70F-9BA8B4D34EE3}"/>
+              </a:ext>
+            </a:extLst>
+          </p:cNvPr>
+          <p:cNvGrpSpPr/>
+          <p:nvPr/>
+        </p:nvGrpSpPr>
+        <p:grpSpPr>
+          <a:xfrm>
+            <a:off x="9305966" y="5212949"/>
+            <a:ext cx="1263131" cy="1153044"/>
+            <a:chOff x="8165944" y="5105379"/>
+            <a:chExt cx="1263131" cy="1153044"/>
+          </a:xfrm>
+        </p:grpSpPr>
+        <p:sp>
+          <p:nvSpPr>
+            <p:cNvPr id="90" name="Rectangle: Rounded Corners 89">
+              <a:extLst>
+                <a:ext uri="{FF2B5EF4-FFF2-40B4-BE49-F238E27FC236}">
+                  <a16:creationId xmlns:a16="http://schemas.microsoft.com/office/drawing/2014/main" id="{12E6FE58-FF41-4AFB-A003-C8E5D86D3120}"/>
+                </a:ext>
+              </a:extLst>
+            </p:cNvPr>
+            <p:cNvSpPr/>
+            <p:nvPr/>
+          </p:nvSpPr>
+          <p:spPr>
+            <a:xfrm>
+              <a:off x="8165947" y="5105379"/>
+              <a:ext cx="1263128" cy="1146303"/>
+            </a:xfrm>
+            <a:prstGeom prst="roundRect">
+              <a:avLst/>
+            </a:prstGeom>
+            <a:solidFill>
+              <a:schemeClr val="bg1"/>
+            </a:solidFill>
+            <a:ln w="28575">
+              <a:solidFill>
+                <a:schemeClr val="tx1"/>
+              </a:solidFill>
+            </a:ln>
+          </p:spPr>
+          <p:style>
+            <a:lnRef idx="2">
+              <a:schemeClr val="accent1">
+                <a:shade val="50000"/>
+              </a:schemeClr>
+            </a:lnRef>
+            <a:fillRef idx="1">
+              <a:schemeClr val="accent1"/>
+            </a:fillRef>
+            <a:effectRef idx="0">
+              <a:schemeClr val="accent1"/>
+            </a:effectRef>
+            <a:fontRef idx="minor">
+              <a:schemeClr val="lt1"/>
+            </a:fontRef>
+          </p:style>
+          <p:txBody>
+            <a:bodyPr rtlCol="0" anchor="ctr"/>
+            <a:lstStyle/>
+            <a:p>
+              <a:pPr algn="ctr"/>
+              <a:endParaRPr lang="en-US"/>
+            </a:p>
+          </p:txBody>
+        </p:sp>
+        <p:sp>
+          <p:nvSpPr>
+            <p:cNvPr id="92" name="TextBox 91">
+              <a:extLst>
+                <a:ext uri="{FF2B5EF4-FFF2-40B4-BE49-F238E27FC236}">
+                  <a16:creationId xmlns:a16="http://schemas.microsoft.com/office/drawing/2014/main" id="{93C5EC70-B217-4553-B047-198A86418366}"/>
+                </a:ext>
+              </a:extLst>
+            </p:cNvPr>
+            <p:cNvSpPr txBox="1"/>
+            <p:nvPr/>
+          </p:nvSpPr>
+          <p:spPr>
+            <a:xfrm>
+              <a:off x="8165944" y="5735203"/>
+              <a:ext cx="1263131" cy="523220"/>
+            </a:xfrm>
+            <a:prstGeom prst="rect">
+              <a:avLst/>
+            </a:prstGeom>
+            <a:noFill/>
+          </p:spPr>
+          <p:txBody>
+            <a:bodyPr wrap="square" rtlCol="0">
+              <a:spAutoFit/>
+            </a:bodyPr>
+            <a:lstStyle/>
+            <a:p>
+              <a:pPr algn="ctr"/>
+              <a:r>
+                <a:rPr lang="en-US" sz="1400" dirty="0"/>
+                <a:t>Telemetry Dashboard</a:t>
+              </a:r>
+            </a:p>
+          </p:txBody>
+        </p:sp>
+        <p:pic>
+          <p:nvPicPr>
+            <p:cNvPr id="86" name="Graphic 85">
+              <a:extLst>
+                <a:ext uri="{FF2B5EF4-FFF2-40B4-BE49-F238E27FC236}">
+                  <a16:creationId xmlns:a16="http://schemas.microsoft.com/office/drawing/2014/main" id="{D23AA3D3-34A1-4FC8-BDDD-C23B2F2D7A76}"/>
+                </a:ext>
+              </a:extLst>
+            </p:cNvPr>
+            <p:cNvPicPr>
+              <a:picLocks noChangeAspect="1"/>
+            </p:cNvPicPr>
+            <p:nvPr/>
+          </p:nvPicPr>
+          <p:blipFill>
+            <a:blip r:embed="rId6">
+              <a:extLst>
+                <a:ext uri="{28A0092B-C50C-407E-A947-70E740481C1C}">
+                  <a14:useLocalDpi xmlns:a14="http://schemas.microsoft.com/office/drawing/2010/main" val="0"/>
+                </a:ext>
+                <a:ext uri="{96DAC541-7B7A-43D3-8B79-37D633B846F1}">
+                  <asvg:svgBlip xmlns:asvg="http://schemas.microsoft.com/office/drawing/2016/SVG/main" r:embed="rId7"/>
+                </a:ext>
+              </a:extLst>
+            </a:blip>
+            <a:stretch>
+              <a:fillRect/>
+            </a:stretch>
+          </p:blipFill>
+          <p:spPr>
+            <a:xfrm>
+              <a:off x="8480572" y="5105379"/>
+              <a:ext cx="609600" cy="609600"/>
+            </a:xfrm>
+            <a:prstGeom prst="rect">
+              <a:avLst/>
+            </a:prstGeom>
+          </p:spPr>
+        </p:pic>
+      </p:grpSp>
+      <p:cxnSp>
+        <p:nvCxnSpPr>
+          <p:cNvPr id="95" name="Straight Arrow Connector 94">
+            <a:extLst>
+              <a:ext uri="{FF2B5EF4-FFF2-40B4-BE49-F238E27FC236}">
+                <a16:creationId xmlns:a16="http://schemas.microsoft.com/office/drawing/2014/main" id="{79F40718-E6CA-4335-B6DF-28389D6A279F}"/>
+              </a:ext>
+            </a:extLst>
+          </p:cNvPr>
+          <p:cNvCxnSpPr>
+            <a:cxnSpLocks/>
+            <a:stCxn id="86" idx="0"/>
+            <a:endCxn id="84" idx="2"/>
+          </p:cNvCxnSpPr>
+          <p:nvPr/>
+        </p:nvCxnSpPr>
+        <p:spPr>
+          <a:xfrm flipV="1">
+            <a:off x="9925394" y="4650122"/>
+            <a:ext cx="12139" cy="562827"/>
+          </a:xfrm>
+          <a:prstGeom prst="straightConnector1">
+            <a:avLst/>
+          </a:prstGeom>
+          <a:ln w="38100">
+            <a:headEnd type="triangle" w="med" len="med"/>
+            <a:tailEnd type="triangle" w="med" len="med"/>
+          </a:ln>
+        </p:spPr>
+        <p:style>
+          <a:lnRef idx="1">
+            <a:schemeClr val="accent1"/>
+          </a:lnRef>
+          <a:fillRef idx="0">
+            <a:schemeClr val="accent1"/>
+          </a:fillRef>
+          <a:effectRef idx="0">
+            <a:schemeClr val="accent1"/>
+          </a:effectRef>
+          <a:fontRef idx="minor">
+            <a:schemeClr val="tx1"/>
+          </a:fontRef>
+        </p:style>
+      </p:cxnSp>
+      <p:sp>
+        <p:nvSpPr>
+          <p:cNvPr id="3" name="Rectangle 2">
+            <a:extLst>
+              <a:ext uri="{FF2B5EF4-FFF2-40B4-BE49-F238E27FC236}">
+                <a16:creationId xmlns:a16="http://schemas.microsoft.com/office/drawing/2014/main" id="{616D1DA5-88FE-491D-AA2A-BD900CA561E2}"/>
+              </a:ext>
+            </a:extLst>
+          </p:cNvPr>
+          <p:cNvSpPr/>
+          <p:nvPr/>
+        </p:nvSpPr>
+        <p:spPr>
+          <a:xfrm>
+            <a:off x="6462274" y="2444001"/>
+            <a:ext cx="825431" cy="1107996"/>
+          </a:xfrm>
+          <a:prstGeom prst="rect">
+            <a:avLst/>
+          </a:prstGeom>
+          <a:noFill/>
+        </p:spPr>
+        <p:txBody>
+          <a:bodyPr wrap="square" lIns="91440" tIns="45720" rIns="91440" bIns="45720">
+            <a:spAutoFit/>
+          </a:bodyPr>
+          <a:lstStyle/>
+          <a:p>
+            <a:pPr algn="ctr"/>
+            <a:r>
+              <a:rPr lang="en-US" sz="7200" b="0" cap="none" spc="0" dirty="0">
+                <a:ln w="0"/>
+                <a:solidFill>
+                  <a:schemeClr val="tx1"/>
+                </a:solidFill>
+                <a:effectLst>
+                  <a:outerShdw blurRad="38100" dist="19050" dir="2700000" algn="tl" rotWithShape="0">
+                    <a:schemeClr val="dk1">
+                      <a:alpha val="40000"/>
+                    </a:schemeClr>
+                  </a:outerShdw>
+                </a:effectLst>
+              </a:rPr>
+              <a:t>?</a:t>
+            </a:r>
+          </a:p>
+        </p:txBody>
+      </p:sp>
+      <p:sp>
+        <p:nvSpPr>
+          <p:cNvPr id="4" name="Rectangle 3">
+            <a:extLst>
+              <a:ext uri="{FF2B5EF4-FFF2-40B4-BE49-F238E27FC236}">
+                <a16:creationId xmlns:a16="http://schemas.microsoft.com/office/drawing/2014/main" id="{4B8B11A9-F613-48AC-A539-FD90B2AFCB7A}"/>
+              </a:ext>
+            </a:extLst>
+          </p:cNvPr>
+          <p:cNvSpPr/>
+          <p:nvPr/>
+        </p:nvSpPr>
+        <p:spPr>
+          <a:xfrm>
+            <a:off x="9587168" y="2647578"/>
+            <a:ext cx="825431" cy="1107996"/>
+          </a:xfrm>
+          <a:prstGeom prst="rect">
+            <a:avLst/>
+          </a:prstGeom>
+          <a:noFill/>
+        </p:spPr>
+        <p:txBody>
+          <a:bodyPr wrap="square" lIns="91440" tIns="45720" rIns="91440" bIns="45720">
+            <a:spAutoFit/>
+          </a:bodyPr>
+          <a:lstStyle/>
+          <a:p>
+            <a:pPr algn="ctr"/>
+            <a:r>
+              <a:rPr lang="en-US" sz="7200" b="0" cap="none" spc="0" dirty="0">
+                <a:ln w="0"/>
+                <a:solidFill>
+                  <a:schemeClr val="tx1"/>
+                </a:solidFill>
+                <a:effectLst>
+                  <a:outerShdw blurRad="38100" dist="19050" dir="2700000" algn="tl" rotWithShape="0">
+                    <a:schemeClr val="dk1">
+                      <a:alpha val="40000"/>
+                    </a:schemeClr>
+                  </a:outerShdw>
+                </a:effectLst>
+              </a:rPr>
+              <a:t>?</a:t>
+            </a:r>
+          </a:p>
+        </p:txBody>
+      </p:sp>
+    </p:spTree>
+    <p:extLst>
+      <p:ext uri="{BB962C8B-B14F-4D97-AF65-F5344CB8AC3E}">
+        <p14:creationId xmlns:p14="http://schemas.microsoft.com/office/powerpoint/2010/main" val="851614554"/>
+      </p:ext>
+    </p:extLst>
+  </p:cSld>
+  <p:clrMapOvr>
+    <a:masterClrMapping/>
+  </p:clrMapOvr>
+</p:sld>
+</file>
+
+<file path=ppt/slides/slide2.xml><?xml version="1.0" encoding="utf-8"?>
+<p:sld xmlns:a="http://schemas.openxmlformats.org/drawingml/2006/main" xmlns:r="http://schemas.openxmlformats.org/officeDocument/2006/relationships" xmlns:p="http://schemas.openxmlformats.org/presentationml/2006/main">
+  <p:cSld>
+    <p:spTree>
+      <p:nvGrpSpPr>
+        <p:cNvPr id="1" name=""/>
+        <p:cNvGrpSpPr/>
+        <p:nvPr/>
+      </p:nvGrpSpPr>
+      <p:grpSpPr>
+        <a:xfrm>
+          <a:off x="0" y="0"/>
+          <a:ext cx="0" cy="0"/>
+          <a:chOff x="0" y="0"/>
+          <a:chExt cx="0" cy="0"/>
+        </a:xfrm>
+      </p:grpSpPr>
+      <p:sp>
+        <p:nvSpPr>
+          <p:cNvPr id="26" name="Rectangle: Rounded Corners 25">
+            <a:extLst>
+              <a:ext uri="{FF2B5EF4-FFF2-40B4-BE49-F238E27FC236}">
+                <a16:creationId xmlns:a16="http://schemas.microsoft.com/office/drawing/2014/main" id="{E224E7AD-CBE4-4ED3-A04B-765699513DF3}"/>
+              </a:ext>
+            </a:extLst>
+          </p:cNvPr>
+          <p:cNvSpPr/>
+          <p:nvPr/>
+        </p:nvSpPr>
+        <p:spPr>
+          <a:xfrm>
+            <a:off x="1379382" y="3146924"/>
+            <a:ext cx="1701410" cy="1552235"/>
+          </a:xfrm>
+          <a:prstGeom prst="roundRect">
+            <a:avLst/>
+          </a:prstGeom>
+          <a:solidFill>
+            <a:schemeClr val="bg1"/>
+          </a:solidFill>
+          <a:ln w="28575">
+            <a:solidFill>
+              <a:schemeClr val="tx1"/>
+            </a:solidFill>
+          </a:ln>
+        </p:spPr>
+        <p:style>
+          <a:lnRef idx="2">
+            <a:schemeClr val="accent1">
+              <a:shade val="50000"/>
+            </a:schemeClr>
+          </a:lnRef>
+          <a:fillRef idx="1">
+            <a:schemeClr val="accent1"/>
+          </a:fillRef>
+          <a:effectRef idx="0">
+            <a:schemeClr val="accent1"/>
+          </a:effectRef>
+          <a:fontRef idx="minor">
+            <a:schemeClr val="lt1"/>
+          </a:fontRef>
+        </p:style>
+        <p:txBody>
+          <a:bodyPr rtlCol="0" anchor="ctr"/>
+          <a:lstStyle/>
+          <a:p>
+            <a:pPr algn="ctr"/>
+            <a:endParaRPr lang="en-US"/>
+          </a:p>
+        </p:txBody>
+      </p:sp>
+      <p:grpSp>
+        <p:nvGrpSpPr>
+          <p:cNvPr id="30" name="Group 29">
+            <a:extLst>
+              <a:ext uri="{FF2B5EF4-FFF2-40B4-BE49-F238E27FC236}">
+                <a16:creationId xmlns:a16="http://schemas.microsoft.com/office/drawing/2014/main" id="{1F551A56-9A50-464C-8452-F668750F8141}"/>
+              </a:ext>
+            </a:extLst>
+          </p:cNvPr>
+          <p:cNvGrpSpPr/>
+          <p:nvPr/>
+        </p:nvGrpSpPr>
+        <p:grpSpPr>
+          <a:xfrm>
+            <a:off x="1887314" y="2217148"/>
+            <a:ext cx="762000" cy="762000"/>
+            <a:chOff x="1190625" y="1381125"/>
+            <a:chExt cx="762000" cy="762000"/>
+          </a:xfrm>
+        </p:grpSpPr>
+        <p:pic>
+          <p:nvPicPr>
+            <p:cNvPr id="5" name="Graphic 4">
+              <a:extLst>
+                <a:ext uri="{FF2B5EF4-FFF2-40B4-BE49-F238E27FC236}">
+                  <a16:creationId xmlns:a16="http://schemas.microsoft.com/office/drawing/2014/main" id="{74DAB90C-8F34-47D4-9541-31D4CC4FD576}"/>
+                </a:ext>
+              </a:extLst>
+            </p:cNvPr>
+            <p:cNvPicPr>
+              <a:picLocks noChangeAspect="1"/>
+            </p:cNvPicPr>
+            <p:nvPr/>
+          </p:nvPicPr>
+          <p:blipFill>
+            <a:blip r:embed="rId2">
+              <a:extLst>
+                <a:ext uri="{28A0092B-C50C-407E-A947-70E740481C1C}">
+                  <a14:useLocalDpi xmlns:a14="http://schemas.microsoft.com/office/drawing/2010/main" val="0"/>
+                </a:ext>
+                <a:ext uri="{96DAC541-7B7A-43D3-8B79-37D633B846F1}">
+                  <asvg:svgBlip xmlns:asvg="http://schemas.microsoft.com/office/drawing/2016/SVG/main" r:embed="rId3"/>
+                </a:ext>
+              </a:extLst>
+            </a:blip>
+            <a:stretch>
+              <a:fillRect/>
+            </a:stretch>
+          </p:blipFill>
+          <p:spPr>
+            <a:xfrm>
+              <a:off x="1190625" y="1381125"/>
+              <a:ext cx="457200" cy="457200"/>
+            </a:xfrm>
+            <a:prstGeom prst="rect">
+              <a:avLst/>
+            </a:prstGeom>
+          </p:spPr>
+        </p:pic>
+        <p:pic>
+          <p:nvPicPr>
+            <p:cNvPr id="7" name="Graphic 6">
+              <a:extLst>
+                <a:ext uri="{FF2B5EF4-FFF2-40B4-BE49-F238E27FC236}">
+                  <a16:creationId xmlns:a16="http://schemas.microsoft.com/office/drawing/2014/main" id="{95CF8D16-4198-4D62-97BB-7ACC8D000388}"/>
+                </a:ext>
+              </a:extLst>
+            </p:cNvPr>
+            <p:cNvPicPr>
+              <a:picLocks noChangeAspect="1"/>
+            </p:cNvPicPr>
+            <p:nvPr/>
+          </p:nvPicPr>
+          <p:blipFill>
+            <a:blip r:embed="rId2">
+              <a:extLst>
+                <a:ext uri="{28A0092B-C50C-407E-A947-70E740481C1C}">
+                  <a14:useLocalDpi xmlns:a14="http://schemas.microsoft.com/office/drawing/2010/main" val="0"/>
+                </a:ext>
+                <a:ext uri="{96DAC541-7B7A-43D3-8B79-37D633B846F1}">
+                  <asvg:svgBlip xmlns:asvg="http://schemas.microsoft.com/office/drawing/2016/SVG/main" r:embed="rId3"/>
+                </a:ext>
+              </a:extLst>
+            </a:blip>
+            <a:stretch>
+              <a:fillRect/>
+            </a:stretch>
+          </p:blipFill>
+          <p:spPr>
+            <a:xfrm>
+              <a:off x="1343025" y="1533525"/>
+              <a:ext cx="457200" cy="457200"/>
+            </a:xfrm>
+            <a:prstGeom prst="rect">
+              <a:avLst/>
+            </a:prstGeom>
+          </p:spPr>
+        </p:pic>
+        <p:pic>
+          <p:nvPicPr>
+            <p:cNvPr id="9" name="Graphic 8">
+              <a:extLst>
+                <a:ext uri="{FF2B5EF4-FFF2-40B4-BE49-F238E27FC236}">
+                  <a16:creationId xmlns:a16="http://schemas.microsoft.com/office/drawing/2014/main" id="{5095A627-44E8-4D21-B3D5-590F36E5E7AF}"/>
+                </a:ext>
+              </a:extLst>
+            </p:cNvPr>
+            <p:cNvPicPr>
+              <a:picLocks noChangeAspect="1"/>
+            </p:cNvPicPr>
+            <p:nvPr/>
+          </p:nvPicPr>
+          <p:blipFill>
+            <a:blip r:embed="rId2">
+              <a:extLst>
+                <a:ext uri="{28A0092B-C50C-407E-A947-70E740481C1C}">
+                  <a14:useLocalDpi xmlns:a14="http://schemas.microsoft.com/office/drawing/2010/main" val="0"/>
+                </a:ext>
+                <a:ext uri="{96DAC541-7B7A-43D3-8B79-37D633B846F1}">
+                  <asvg:svgBlip xmlns:asvg="http://schemas.microsoft.com/office/drawing/2016/SVG/main" r:embed="rId3"/>
+                </a:ext>
+              </a:extLst>
+            </a:blip>
+            <a:stretch>
+              <a:fillRect/>
+            </a:stretch>
+          </p:blipFill>
+          <p:spPr>
+            <a:xfrm>
+              <a:off x="1495425" y="1685925"/>
+              <a:ext cx="457200" cy="457200"/>
+            </a:xfrm>
+            <a:prstGeom prst="rect">
+              <a:avLst/>
+            </a:prstGeom>
+          </p:spPr>
+        </p:pic>
+      </p:grpSp>
       <p:pic>
         <p:nvPicPr>
           <p:cNvPr id="11" name="Graphic 10">
@@ -5644,7 +6966,7 @@
     </p:spTree>
     <p:extLst>
       <p:ext uri="{BB962C8B-B14F-4D97-AF65-F5344CB8AC3E}">
-        <p14:creationId xmlns:p14="http://schemas.microsoft.com/office/powerpoint/2010/main" val="851614554"/>
+        <p14:creationId xmlns:p14="http://schemas.microsoft.com/office/powerpoint/2010/main" val="3566589780"/>
       </p:ext>
     </p:extLst>
   </p:cSld>

</xml_diff>

<commit_message>
Add device factory and signaling using interface
</commit_message>
<xml_diff>
--- a/Documents/Diagrams.pptx
+++ b/Documents/Diagrams.pptx
@@ -260,7 +260,7 @@
           <a:p>
             <a:fld id="{33C3F64C-C526-40FB-AED9-C37B4F96ABD4}" type="datetimeFigureOut">
               <a:rPr lang="en-US" smtClean="0"/>
-              <a:t>20-Jan-21</a:t>
+              <a:t>26-Jan-21</a:t>
             </a:fld>
             <a:endParaRPr lang="en-US"/>
           </a:p>
@@ -458,7 +458,7 @@
           <a:p>
             <a:fld id="{33C3F64C-C526-40FB-AED9-C37B4F96ABD4}" type="datetimeFigureOut">
               <a:rPr lang="en-US" smtClean="0"/>
-              <a:t>20-Jan-21</a:t>
+              <a:t>26-Jan-21</a:t>
             </a:fld>
             <a:endParaRPr lang="en-US"/>
           </a:p>
@@ -666,7 +666,7 @@
           <a:p>
             <a:fld id="{33C3F64C-C526-40FB-AED9-C37B4F96ABD4}" type="datetimeFigureOut">
               <a:rPr lang="en-US" smtClean="0"/>
-              <a:t>20-Jan-21</a:t>
+              <a:t>26-Jan-21</a:t>
             </a:fld>
             <a:endParaRPr lang="en-US"/>
           </a:p>
@@ -864,7 +864,7 @@
           <a:p>
             <a:fld id="{33C3F64C-C526-40FB-AED9-C37B4F96ABD4}" type="datetimeFigureOut">
               <a:rPr lang="en-US" smtClean="0"/>
-              <a:t>20-Jan-21</a:t>
+              <a:t>26-Jan-21</a:t>
             </a:fld>
             <a:endParaRPr lang="en-US"/>
           </a:p>
@@ -1139,7 +1139,7 @@
           <a:p>
             <a:fld id="{33C3F64C-C526-40FB-AED9-C37B4F96ABD4}" type="datetimeFigureOut">
               <a:rPr lang="en-US" smtClean="0"/>
-              <a:t>20-Jan-21</a:t>
+              <a:t>26-Jan-21</a:t>
             </a:fld>
             <a:endParaRPr lang="en-US"/>
           </a:p>
@@ -1404,7 +1404,7 @@
           <a:p>
             <a:fld id="{33C3F64C-C526-40FB-AED9-C37B4F96ABD4}" type="datetimeFigureOut">
               <a:rPr lang="en-US" smtClean="0"/>
-              <a:t>20-Jan-21</a:t>
+              <a:t>26-Jan-21</a:t>
             </a:fld>
             <a:endParaRPr lang="en-US"/>
           </a:p>
@@ -1816,7 +1816,7 @@
           <a:p>
             <a:fld id="{33C3F64C-C526-40FB-AED9-C37B4F96ABD4}" type="datetimeFigureOut">
               <a:rPr lang="en-US" smtClean="0"/>
-              <a:t>20-Jan-21</a:t>
+              <a:t>26-Jan-21</a:t>
             </a:fld>
             <a:endParaRPr lang="en-US"/>
           </a:p>
@@ -1957,7 +1957,7 @@
           <a:p>
             <a:fld id="{33C3F64C-C526-40FB-AED9-C37B4F96ABD4}" type="datetimeFigureOut">
               <a:rPr lang="en-US" smtClean="0"/>
-              <a:t>20-Jan-21</a:t>
+              <a:t>26-Jan-21</a:t>
             </a:fld>
             <a:endParaRPr lang="en-US"/>
           </a:p>
@@ -2070,7 +2070,7 @@
           <a:p>
             <a:fld id="{33C3F64C-C526-40FB-AED9-C37B4F96ABD4}" type="datetimeFigureOut">
               <a:rPr lang="en-US" smtClean="0"/>
-              <a:t>20-Jan-21</a:t>
+              <a:t>26-Jan-21</a:t>
             </a:fld>
             <a:endParaRPr lang="en-US"/>
           </a:p>
@@ -2381,7 +2381,7 @@
           <a:p>
             <a:fld id="{33C3F64C-C526-40FB-AED9-C37B4F96ABD4}" type="datetimeFigureOut">
               <a:rPr lang="en-US" smtClean="0"/>
-              <a:t>20-Jan-21</a:t>
+              <a:t>26-Jan-21</a:t>
             </a:fld>
             <a:endParaRPr lang="en-US"/>
           </a:p>
@@ -2669,7 +2669,7 @@
           <a:p>
             <a:fld id="{33C3F64C-C526-40FB-AED9-C37B4F96ABD4}" type="datetimeFigureOut">
               <a:rPr lang="en-US" smtClean="0"/>
-              <a:t>20-Jan-21</a:t>
+              <a:t>26-Jan-21</a:t>
             </a:fld>
             <a:endParaRPr lang="en-US"/>
           </a:p>
@@ -2910,7 +2910,7 @@
           <a:p>
             <a:fld id="{33C3F64C-C526-40FB-AED9-C37B4F96ABD4}" type="datetimeFigureOut">
               <a:rPr lang="en-US" smtClean="0"/>
-              <a:t>20-Jan-21</a:t>
+              <a:t>26-Jan-21</a:t>
             </a:fld>
             <a:endParaRPr lang="en-US"/>
           </a:p>
@@ -3341,8 +3341,8 @@
         </p:nvSpPr>
         <p:spPr>
           <a:xfrm>
-            <a:off x="1379382" y="3146924"/>
-            <a:ext cx="1701410" cy="1552235"/>
+            <a:off x="1595922" y="3233838"/>
+            <a:ext cx="1269423" cy="1079131"/>
           </a:xfrm>
           <a:prstGeom prst="roundRect">
             <a:avLst/>
@@ -3533,8 +3533,8 @@
         </p:nvSpPr>
         <p:spPr>
           <a:xfrm>
-            <a:off x="1379382" y="4309000"/>
-            <a:ext cx="1701411" cy="307777"/>
+            <a:off x="1637580" y="3933394"/>
+            <a:ext cx="1227766" cy="307777"/>
           </a:xfrm>
           <a:prstGeom prst="rect">
             <a:avLst/>
@@ -3550,7 +3550,7 @@
             <a:pPr algn="ctr"/>
             <a:r>
               <a:rPr lang="en-US" sz="1400" dirty="0"/>
-              <a:t>Telemetry Simulator</a:t>
+              <a:t>Simulator</a:t>
             </a:r>
           </a:p>
         </p:txBody>
@@ -3616,8 +3616,8 @@
         </p:nvCxnSpPr>
         <p:spPr>
           <a:xfrm flipV="1">
-            <a:off x="3080792" y="3250610"/>
-            <a:ext cx="947875" cy="672432"/>
+            <a:off x="2865345" y="3250610"/>
+            <a:ext cx="1163322" cy="522794"/>
           </a:xfrm>
           <a:prstGeom prst="straightConnector1">
             <a:avLst/>
@@ -3805,7 +3805,7 @@
         </p:nvGrpSpPr>
         <p:grpSpPr>
           <a:xfrm>
-            <a:off x="9034288" y="2450323"/>
+            <a:off x="9034288" y="2345815"/>
             <a:ext cx="1931195" cy="1775732"/>
             <a:chOff x="9578112" y="2087404"/>
             <a:chExt cx="1931195" cy="1775732"/>
@@ -4075,7 +4075,7 @@
         <p:spPr>
           <a:xfrm>
             <a:off x="7748282" y="3233838"/>
-            <a:ext cx="900487" cy="20492"/>
+            <a:ext cx="900487" cy="3074"/>
           </a:xfrm>
           <a:prstGeom prst="straightConnector1">
             <a:avLst/>
@@ -4113,7 +4113,7 @@
         </p:nvGrpSpPr>
         <p:grpSpPr>
           <a:xfrm>
-            <a:off x="8648769" y="3167244"/>
+            <a:off x="8648769" y="3149826"/>
             <a:ext cx="374469" cy="174171"/>
             <a:chOff x="6435634" y="5416731"/>
             <a:chExt cx="374469" cy="174171"/>
@@ -4225,7 +4225,7 @@
         </p:nvGrpSpPr>
         <p:grpSpPr>
           <a:xfrm rot="16200000">
-            <a:off x="9750298" y="4375802"/>
+            <a:off x="9750296" y="4221696"/>
             <a:ext cx="374469" cy="174171"/>
             <a:chOff x="6435634" y="5416731"/>
             <a:chExt cx="374469" cy="174171"/>
@@ -4491,8 +4491,8 @@
         </p:nvCxnSpPr>
         <p:spPr>
           <a:xfrm flipV="1">
-            <a:off x="9925394" y="4650122"/>
-            <a:ext cx="12139" cy="562827"/>
+            <a:off x="9925394" y="4496016"/>
+            <a:ext cx="12137" cy="716933"/>
           </a:xfrm>
           <a:prstGeom prst="straightConnector1">
             <a:avLst/>
@@ -4609,6 +4609,81 @@
                 </a:effectLst>
               </a:rPr>
               <a:t>?</a:t>
+            </a:r>
+          </a:p>
+        </p:txBody>
+      </p:sp>
+      <p:pic>
+        <p:nvPicPr>
+          <p:cNvPr id="6" name="Graphic 5">
+            <a:extLst>
+              <a:ext uri="{FF2B5EF4-FFF2-40B4-BE49-F238E27FC236}">
+                <a16:creationId xmlns:a16="http://schemas.microsoft.com/office/drawing/2014/main" id="{7B5D6211-81D7-4CDB-9200-E6A2849208A2}"/>
+              </a:ext>
+            </a:extLst>
+          </p:cNvPr>
+          <p:cNvPicPr>
+            <a:picLocks noChangeAspect="1"/>
+          </p:cNvPicPr>
+          <p:nvPr/>
+        </p:nvPicPr>
+        <p:blipFill>
+          <a:blip r:embed="rId8">
+            <a:extLst>
+              <a:ext uri="{28A0092B-C50C-407E-A947-70E740481C1C}">
+                <a14:useLocalDpi xmlns:a14="http://schemas.microsoft.com/office/drawing/2010/main" val="0"/>
+              </a:ext>
+              <a:ext uri="{96DAC541-7B7A-43D3-8B79-37D633B846F1}">
+                <asvg:svgBlip xmlns:asvg="http://schemas.microsoft.com/office/drawing/2016/SVG/main" r:embed="rId9"/>
+              </a:ext>
+            </a:extLst>
+          </a:blip>
+          <a:stretch>
+            <a:fillRect/>
+          </a:stretch>
+        </p:blipFill>
+        <p:spPr>
+          <a:xfrm>
+            <a:off x="1738674" y="3114855"/>
+            <a:ext cx="952500" cy="952500"/>
+          </a:xfrm>
+          <a:prstGeom prst="rect">
+            <a:avLst/>
+          </a:prstGeom>
+        </p:spPr>
+      </p:pic>
+      <p:sp>
+        <p:nvSpPr>
+          <p:cNvPr id="11" name="TextBox 10">
+            <a:extLst>
+              <a:ext uri="{FF2B5EF4-FFF2-40B4-BE49-F238E27FC236}">
+                <a16:creationId xmlns:a16="http://schemas.microsoft.com/office/drawing/2014/main" id="{C924919A-B8B3-461C-81D1-DEFDFEE84922}"/>
+              </a:ext>
+            </a:extLst>
+          </p:cNvPr>
+          <p:cNvSpPr txBox="1"/>
+          <p:nvPr/>
+        </p:nvSpPr>
+        <p:spPr>
+          <a:xfrm>
+            <a:off x="1637580" y="1952292"/>
+            <a:ext cx="1227766" cy="307777"/>
+          </a:xfrm>
+          <a:prstGeom prst="rect">
+            <a:avLst/>
+          </a:prstGeom>
+          <a:noFill/>
+        </p:spPr>
+        <p:txBody>
+          <a:bodyPr wrap="square" rtlCol="0">
+            <a:spAutoFit/>
+          </a:bodyPr>
+          <a:lstStyle/>
+          <a:p>
+            <a:pPr algn="ctr"/>
+            <a:r>
+              <a:rPr lang="en-US" sz="1400" dirty="0"/>
+              <a:t>Devices</a:t>
             </a:r>
           </a:p>
         </p:txBody>

</xml_diff>